<commit_message>
three coil jorunal matlab files
</commit_message>
<xml_diff>
--- a/WPT/3-coil/Three-Coil-Journal/matlab/3rd-harmonic/New Microsoft PowerPoint Presentation.pptx
+++ b/WPT/3-coil/Three-Coil-Journal/matlab/3rd-harmonic/New Microsoft PowerPoint Presentation.pptx
@@ -6,6 +6,9 @@
   </p:sldMasterIdLst>
   <p:sldIdLst>
     <p:sldId id="256" r:id="rId2"/>
+    <p:sldId id="257" r:id="rId3"/>
+    <p:sldId id="258" r:id="rId4"/>
+    <p:sldId id="259" r:id="rId5"/>
   </p:sldIdLst>
   <p:sldSz cx="12192000" cy="6858000"/>
   <p:notesSz cx="6858000" cy="9144000"/>
@@ -104,6 +107,11 @@
       </a:defRPr>
     </a:lvl9pPr>
   </p:defaultTextStyle>
+  <p:extLst>
+    <p:ext uri="{EFAFB233-063F-42B5-8137-9DF3F51BA10A}">
+      <p15:sldGuideLst xmlns:p15="http://schemas.microsoft.com/office/powerpoint/2012/main"/>
+    </p:ext>
+  </p:extLst>
 </p:presentation>
 </file>
 
@@ -254,7 +262,7 @@
           <a:p>
             <a:fld id="{2363B7C9-162A-4A99-9B0C-3E0E49FF713C}" type="datetimeFigureOut">
               <a:rPr lang="en-US" smtClean="0"/>
-              <a:t>2/9/2022</a:t>
+              <a:t>3/15/2022</a:t>
             </a:fld>
             <a:endParaRPr lang="en-US"/>
           </a:p>
@@ -452,7 +460,7 @@
           <a:p>
             <a:fld id="{2363B7C9-162A-4A99-9B0C-3E0E49FF713C}" type="datetimeFigureOut">
               <a:rPr lang="en-US" smtClean="0"/>
-              <a:t>2/9/2022</a:t>
+              <a:t>3/15/2022</a:t>
             </a:fld>
             <a:endParaRPr lang="en-US"/>
           </a:p>
@@ -660,7 +668,7 @@
           <a:p>
             <a:fld id="{2363B7C9-162A-4A99-9B0C-3E0E49FF713C}" type="datetimeFigureOut">
               <a:rPr lang="en-US" smtClean="0"/>
-              <a:t>2/9/2022</a:t>
+              <a:t>3/15/2022</a:t>
             </a:fld>
             <a:endParaRPr lang="en-US"/>
           </a:p>
@@ -858,7 +866,7 @@
           <a:p>
             <a:fld id="{2363B7C9-162A-4A99-9B0C-3E0E49FF713C}" type="datetimeFigureOut">
               <a:rPr lang="en-US" smtClean="0"/>
-              <a:t>2/9/2022</a:t>
+              <a:t>3/15/2022</a:t>
             </a:fld>
             <a:endParaRPr lang="en-US"/>
           </a:p>
@@ -1133,7 +1141,7 @@
           <a:p>
             <a:fld id="{2363B7C9-162A-4A99-9B0C-3E0E49FF713C}" type="datetimeFigureOut">
               <a:rPr lang="en-US" smtClean="0"/>
-              <a:t>2/9/2022</a:t>
+              <a:t>3/15/2022</a:t>
             </a:fld>
             <a:endParaRPr lang="en-US"/>
           </a:p>
@@ -1398,7 +1406,7 @@
           <a:p>
             <a:fld id="{2363B7C9-162A-4A99-9B0C-3E0E49FF713C}" type="datetimeFigureOut">
               <a:rPr lang="en-US" smtClean="0"/>
-              <a:t>2/9/2022</a:t>
+              <a:t>3/15/2022</a:t>
             </a:fld>
             <a:endParaRPr lang="en-US"/>
           </a:p>
@@ -1810,7 +1818,7 @@
           <a:p>
             <a:fld id="{2363B7C9-162A-4A99-9B0C-3E0E49FF713C}" type="datetimeFigureOut">
               <a:rPr lang="en-US" smtClean="0"/>
-              <a:t>2/9/2022</a:t>
+              <a:t>3/15/2022</a:t>
             </a:fld>
             <a:endParaRPr lang="en-US"/>
           </a:p>
@@ -1951,7 +1959,7 @@
           <a:p>
             <a:fld id="{2363B7C9-162A-4A99-9B0C-3E0E49FF713C}" type="datetimeFigureOut">
               <a:rPr lang="en-US" smtClean="0"/>
-              <a:t>2/9/2022</a:t>
+              <a:t>3/15/2022</a:t>
             </a:fld>
             <a:endParaRPr lang="en-US"/>
           </a:p>
@@ -2064,7 +2072,7 @@
           <a:p>
             <a:fld id="{2363B7C9-162A-4A99-9B0C-3E0E49FF713C}" type="datetimeFigureOut">
               <a:rPr lang="en-US" smtClean="0"/>
-              <a:t>2/9/2022</a:t>
+              <a:t>3/15/2022</a:t>
             </a:fld>
             <a:endParaRPr lang="en-US"/>
           </a:p>
@@ -2375,7 +2383,7 @@
           <a:p>
             <a:fld id="{2363B7C9-162A-4A99-9B0C-3E0E49FF713C}" type="datetimeFigureOut">
               <a:rPr lang="en-US" smtClean="0"/>
-              <a:t>2/9/2022</a:t>
+              <a:t>3/15/2022</a:t>
             </a:fld>
             <a:endParaRPr lang="en-US"/>
           </a:p>
@@ -2663,7 +2671,7 @@
           <a:p>
             <a:fld id="{2363B7C9-162A-4A99-9B0C-3E0E49FF713C}" type="datetimeFigureOut">
               <a:rPr lang="en-US" smtClean="0"/>
-              <a:t>2/9/2022</a:t>
+              <a:t>3/15/2022</a:t>
             </a:fld>
             <a:endParaRPr lang="en-US"/>
           </a:p>
@@ -2904,7 +2912,7 @@
           <a:p>
             <a:fld id="{2363B7C9-162A-4A99-9B0C-3E0E49FF713C}" type="datetimeFigureOut">
               <a:rPr lang="en-US" smtClean="0"/>
-              <a:t>2/9/2022</a:t>
+              <a:t>3/15/2022</a:t>
             </a:fld>
             <a:endParaRPr lang="en-US"/>
           </a:p>
@@ -3424,6 +3432,316 @@
 </p:sld>
 </file>
 
+<file path=ppt/slides/slide2.xml><?xml version="1.0" encoding="utf-8"?>
+<p:sld xmlns:a="http://schemas.openxmlformats.org/drawingml/2006/main" xmlns:r="http://schemas.openxmlformats.org/officeDocument/2006/relationships" xmlns:p="http://schemas.openxmlformats.org/presentationml/2006/main">
+  <p:cSld>
+    <p:spTree>
+      <p:nvGrpSpPr>
+        <p:cNvPr id="1" name=""/>
+        <p:cNvGrpSpPr/>
+        <p:nvPr/>
+      </p:nvGrpSpPr>
+      <p:grpSpPr>
+        <a:xfrm>
+          <a:off x="0" y="0"/>
+          <a:ext cx="0" cy="0"/>
+          <a:chOff x="0" y="0"/>
+          <a:chExt cx="0" cy="0"/>
+        </a:xfrm>
+      </p:grpSpPr>
+      <p:pic>
+        <p:nvPicPr>
+          <p:cNvPr id="4" name="Picture 3">
+            <a:extLst>
+              <a:ext uri="{FF2B5EF4-FFF2-40B4-BE49-F238E27FC236}">
+                <a16:creationId xmlns:a16="http://schemas.microsoft.com/office/drawing/2014/main" id="{24921606-4381-4F7A-B80D-C5CCB104679B}"/>
+              </a:ext>
+            </a:extLst>
+          </p:cNvPr>
+          <p:cNvPicPr>
+            <a:picLocks noChangeAspect="1"/>
+          </p:cNvPicPr>
+          <p:nvPr/>
+        </p:nvPicPr>
+        <p:blipFill>
+          <a:blip r:embed="rId2"/>
+          <a:stretch>
+            <a:fillRect/>
+          </a:stretch>
+        </p:blipFill>
+        <p:spPr>
+          <a:xfrm>
+            <a:off x="2526484" y="3088929"/>
+            <a:ext cx="5715000" cy="1428750"/>
+          </a:xfrm>
+          <a:prstGeom prst="rect">
+            <a:avLst/>
+          </a:prstGeom>
+        </p:spPr>
+      </p:pic>
+      <p:pic>
+        <p:nvPicPr>
+          <p:cNvPr id="5" name="Picture 4">
+            <a:extLst>
+              <a:ext uri="{FF2B5EF4-FFF2-40B4-BE49-F238E27FC236}">
+                <a16:creationId xmlns:a16="http://schemas.microsoft.com/office/drawing/2014/main" id="{ACEFB211-4E8E-4FBD-BA4F-EBBE65CECC27}"/>
+              </a:ext>
+            </a:extLst>
+          </p:cNvPr>
+          <p:cNvPicPr>
+            <a:picLocks noChangeAspect="1"/>
+          </p:cNvPicPr>
+          <p:nvPr/>
+        </p:nvPicPr>
+        <p:blipFill>
+          <a:blip r:embed="rId3"/>
+          <a:stretch>
+            <a:fillRect/>
+          </a:stretch>
+        </p:blipFill>
+        <p:spPr>
+          <a:xfrm>
+            <a:off x="2526484" y="1751120"/>
+            <a:ext cx="5715000" cy="1424940"/>
+          </a:xfrm>
+          <a:prstGeom prst="rect">
+            <a:avLst/>
+          </a:prstGeom>
+        </p:spPr>
+      </p:pic>
+      <p:pic>
+        <p:nvPicPr>
+          <p:cNvPr id="6" name="Picture 5">
+            <a:extLst>
+              <a:ext uri="{FF2B5EF4-FFF2-40B4-BE49-F238E27FC236}">
+                <a16:creationId xmlns:a16="http://schemas.microsoft.com/office/drawing/2014/main" id="{315668CA-B2DD-4806-BBAB-648647482F46}"/>
+              </a:ext>
+            </a:extLst>
+          </p:cNvPr>
+          <p:cNvPicPr>
+            <a:picLocks noChangeAspect="1"/>
+          </p:cNvPicPr>
+          <p:nvPr/>
+        </p:nvPicPr>
+        <p:blipFill>
+          <a:blip r:embed="rId4"/>
+          <a:stretch>
+            <a:fillRect/>
+          </a:stretch>
+        </p:blipFill>
+        <p:spPr>
+          <a:xfrm>
+            <a:off x="2526484" y="409501"/>
+            <a:ext cx="5715000" cy="1424940"/>
+          </a:xfrm>
+          <a:prstGeom prst="rect">
+            <a:avLst/>
+          </a:prstGeom>
+        </p:spPr>
+      </p:pic>
+      <p:pic>
+        <p:nvPicPr>
+          <p:cNvPr id="7" name="Picture 6">
+            <a:extLst>
+              <a:ext uri="{FF2B5EF4-FFF2-40B4-BE49-F238E27FC236}">
+                <a16:creationId xmlns:a16="http://schemas.microsoft.com/office/drawing/2014/main" id="{1230AFF6-D4A5-4E01-B029-DD9400ECB516}"/>
+              </a:ext>
+            </a:extLst>
+          </p:cNvPr>
+          <p:cNvPicPr>
+            <a:picLocks noChangeAspect="1"/>
+          </p:cNvPicPr>
+          <p:nvPr/>
+        </p:nvPicPr>
+        <p:blipFill rotWithShape="1">
+          <a:blip r:embed="rId5"/>
+          <a:srcRect t="79514"/>
+          <a:stretch/>
+        </p:blipFill>
+        <p:spPr>
+          <a:xfrm>
+            <a:off x="2526484" y="4517679"/>
+            <a:ext cx="5715000" cy="291909"/>
+          </a:xfrm>
+          <a:prstGeom prst="rect">
+            <a:avLst/>
+          </a:prstGeom>
+        </p:spPr>
+      </p:pic>
+    </p:spTree>
+    <p:extLst>
+      <p:ext uri="{BB962C8B-B14F-4D97-AF65-F5344CB8AC3E}">
+        <p14:creationId xmlns:p14="http://schemas.microsoft.com/office/powerpoint/2010/main" val="979408610"/>
+      </p:ext>
+    </p:extLst>
+  </p:cSld>
+  <p:clrMapOvr>
+    <a:masterClrMapping/>
+  </p:clrMapOvr>
+</p:sld>
+</file>
+
+<file path=ppt/slides/slide3.xml><?xml version="1.0" encoding="utf-8"?>
+<p:sld xmlns:a="http://schemas.openxmlformats.org/drawingml/2006/main" xmlns:r="http://schemas.openxmlformats.org/officeDocument/2006/relationships" xmlns:p="http://schemas.openxmlformats.org/presentationml/2006/main">
+  <p:cSld>
+    <p:spTree>
+      <p:nvGrpSpPr>
+        <p:cNvPr id="1" name=""/>
+        <p:cNvGrpSpPr/>
+        <p:nvPr/>
+      </p:nvGrpSpPr>
+      <p:grpSpPr>
+        <a:xfrm>
+          <a:off x="0" y="0"/>
+          <a:ext cx="0" cy="0"/>
+          <a:chOff x="0" y="0"/>
+          <a:chExt cx="0" cy="0"/>
+        </a:xfrm>
+      </p:grpSpPr>
+      <p:pic>
+        <p:nvPicPr>
+          <p:cNvPr id="4" name="Graphic 3">
+            <a:extLst>
+              <a:ext uri="{FF2B5EF4-FFF2-40B4-BE49-F238E27FC236}">
+                <a16:creationId xmlns:a16="http://schemas.microsoft.com/office/drawing/2014/main" id="{380F7D8C-C525-450D-AB83-DC4151545090}"/>
+              </a:ext>
+            </a:extLst>
+          </p:cNvPr>
+          <p:cNvPicPr>
+            <a:picLocks noChangeAspect="1"/>
+          </p:cNvPicPr>
+          <p:nvPr/>
+        </p:nvPicPr>
+        <p:blipFill>
+          <a:blip r:embed="rId2">
+            <a:extLst>
+              <a:ext uri="{96DAC541-7B7A-43D3-8B79-37D633B846F1}">
+                <asvg:svgBlip xmlns:asvg="http://schemas.microsoft.com/office/drawing/2016/SVG/main" r:embed="rId3"/>
+              </a:ext>
+            </a:extLst>
+          </a:blip>
+          <a:stretch>
+            <a:fillRect/>
+          </a:stretch>
+        </p:blipFill>
+        <p:spPr>
+          <a:xfrm>
+            <a:off x="3390900" y="1333500"/>
+            <a:ext cx="5410200" cy="4191000"/>
+          </a:xfrm>
+          <a:prstGeom prst="rect">
+            <a:avLst/>
+          </a:prstGeom>
+        </p:spPr>
+      </p:pic>
+    </p:spTree>
+    <p:extLst>
+      <p:ext uri="{BB962C8B-B14F-4D97-AF65-F5344CB8AC3E}">
+        <p14:creationId xmlns:p14="http://schemas.microsoft.com/office/powerpoint/2010/main" val="3473662603"/>
+      </p:ext>
+    </p:extLst>
+  </p:cSld>
+  <p:clrMapOvr>
+    <a:masterClrMapping/>
+  </p:clrMapOvr>
+</p:sld>
+</file>
+
+<file path=ppt/slides/slide4.xml><?xml version="1.0" encoding="utf-8"?>
+<p:sld xmlns:a="http://schemas.openxmlformats.org/drawingml/2006/main" xmlns:r="http://schemas.openxmlformats.org/officeDocument/2006/relationships" xmlns:p="http://schemas.openxmlformats.org/presentationml/2006/main">
+  <p:cSld>
+    <p:spTree>
+      <p:nvGrpSpPr>
+        <p:cNvPr id="1" name=""/>
+        <p:cNvGrpSpPr/>
+        <p:nvPr/>
+      </p:nvGrpSpPr>
+      <p:grpSpPr>
+        <a:xfrm>
+          <a:off x="0" y="0"/>
+          <a:ext cx="0" cy="0"/>
+          <a:chOff x="0" y="0"/>
+          <a:chExt cx="0" cy="0"/>
+        </a:xfrm>
+      </p:grpSpPr>
+      <p:pic>
+        <p:nvPicPr>
+          <p:cNvPr id="4" name="Graphic 3">
+            <a:extLst>
+              <a:ext uri="{FF2B5EF4-FFF2-40B4-BE49-F238E27FC236}">
+                <a16:creationId xmlns:a16="http://schemas.microsoft.com/office/drawing/2014/main" id="{73B0B9DA-BF06-40E0-9FEC-04433DB89419}"/>
+              </a:ext>
+            </a:extLst>
+          </p:cNvPr>
+          <p:cNvPicPr>
+            <a:picLocks noChangeAspect="1"/>
+          </p:cNvPicPr>
+          <p:nvPr/>
+        </p:nvPicPr>
+        <p:blipFill>
+          <a:blip r:embed="rId2">
+            <a:extLst>
+              <a:ext uri="{96DAC541-7B7A-43D3-8B79-37D633B846F1}">
+                <asvg:svgBlip xmlns:asvg="http://schemas.microsoft.com/office/drawing/2016/SVG/main" r:embed="rId3"/>
+              </a:ext>
+            </a:extLst>
+          </a:blip>
+          <a:stretch>
+            <a:fillRect/>
+          </a:stretch>
+        </p:blipFill>
+        <p:spPr>
+          <a:xfrm>
+            <a:off x="3395662" y="2203511"/>
+            <a:ext cx="5400675" cy="4191000"/>
+          </a:xfrm>
+          <a:prstGeom prst="rect">
+            <a:avLst/>
+          </a:prstGeom>
+        </p:spPr>
+      </p:pic>
+      <p:pic>
+        <p:nvPicPr>
+          <p:cNvPr id="5" name="Picture 4">
+            <a:extLst>
+              <a:ext uri="{FF2B5EF4-FFF2-40B4-BE49-F238E27FC236}">
+                <a16:creationId xmlns:a16="http://schemas.microsoft.com/office/drawing/2014/main" id="{FD4AAF71-2A30-4462-A5FC-373380F27D5B}"/>
+              </a:ext>
+            </a:extLst>
+          </p:cNvPr>
+          <p:cNvPicPr>
+            <a:picLocks noChangeAspect="1"/>
+          </p:cNvPicPr>
+          <p:nvPr/>
+        </p:nvPicPr>
+        <p:blipFill rotWithShape="1">
+          <a:blip r:embed="rId4"/>
+          <a:srcRect r="91858"/>
+          <a:stretch/>
+        </p:blipFill>
+        <p:spPr>
+          <a:xfrm>
+            <a:off x="2930371" y="3340223"/>
+            <a:ext cx="465291" cy="1424940"/>
+          </a:xfrm>
+          <a:prstGeom prst="rect">
+            <a:avLst/>
+          </a:prstGeom>
+        </p:spPr>
+      </p:pic>
+    </p:spTree>
+    <p:extLst>
+      <p:ext uri="{BB962C8B-B14F-4D97-AF65-F5344CB8AC3E}">
+        <p14:creationId xmlns:p14="http://schemas.microsoft.com/office/powerpoint/2010/main" val="1048938148"/>
+      </p:ext>
+    </p:extLst>
+  </p:cSld>
+  <p:clrMapOvr>
+    <a:masterClrMapping/>
+  </p:clrMapOvr>
+</p:sld>
+</file>
+
 <file path=ppt/theme/theme1.xml><?xml version="1.0" encoding="utf-8"?>
 <a:theme xmlns:a="http://schemas.openxmlformats.org/drawingml/2006/main" name="Office Theme">
   <a:themeElements>

</xml_diff>